<commit_message>
Next and Previous disabling works in all cases except loading a deck
</commit_message>
<xml_diff>
--- a/Documentation/Mobile Development.pptx
+++ b/Documentation/Mobile Development.pptx
@@ -295,7 +295,7 @@
           <a:p>
             <a:fld id="{79CBEA78-6588-4CE9-8068-CCA8CA5A7265}" type="datetimeFigureOut">
               <a:rPr lang="en-US" smtClean="0"/>
-              <a:t>5/8/2013</a:t>
+              <a:t>5/10/2013</a:t>
             </a:fld>
             <a:endParaRPr lang="en-US"/>
           </a:p>
@@ -465,7 +465,7 @@
           <a:p>
             <a:fld id="{79CBEA78-6588-4CE9-8068-CCA8CA5A7265}" type="datetimeFigureOut">
               <a:rPr lang="en-US" smtClean="0"/>
-              <a:t>5/8/2013</a:t>
+              <a:t>5/10/2013</a:t>
             </a:fld>
             <a:endParaRPr lang="en-US"/>
           </a:p>
@@ -645,7 +645,7 @@
           <a:p>
             <a:fld id="{79CBEA78-6588-4CE9-8068-CCA8CA5A7265}" type="datetimeFigureOut">
               <a:rPr lang="en-US" smtClean="0"/>
-              <a:t>5/8/2013</a:t>
+              <a:t>5/10/2013</a:t>
             </a:fld>
             <a:endParaRPr lang="en-US"/>
           </a:p>
@@ -815,7 +815,7 @@
           <a:p>
             <a:fld id="{79CBEA78-6588-4CE9-8068-CCA8CA5A7265}" type="datetimeFigureOut">
               <a:rPr lang="en-US" smtClean="0"/>
-              <a:t>5/8/2013</a:t>
+              <a:t>5/10/2013</a:t>
             </a:fld>
             <a:endParaRPr lang="en-US"/>
           </a:p>
@@ -1061,7 +1061,7 @@
           <a:p>
             <a:fld id="{79CBEA78-6588-4CE9-8068-CCA8CA5A7265}" type="datetimeFigureOut">
               <a:rPr lang="en-US" smtClean="0"/>
-              <a:t>5/8/2013</a:t>
+              <a:t>5/10/2013</a:t>
             </a:fld>
             <a:endParaRPr lang="en-US"/>
           </a:p>
@@ -1349,7 +1349,7 @@
           <a:p>
             <a:fld id="{79CBEA78-6588-4CE9-8068-CCA8CA5A7265}" type="datetimeFigureOut">
               <a:rPr lang="en-US" smtClean="0"/>
-              <a:t>5/8/2013</a:t>
+              <a:t>5/10/2013</a:t>
             </a:fld>
             <a:endParaRPr lang="en-US"/>
           </a:p>
@@ -1771,7 +1771,7 @@
           <a:p>
             <a:fld id="{79CBEA78-6588-4CE9-8068-CCA8CA5A7265}" type="datetimeFigureOut">
               <a:rPr lang="en-US" smtClean="0"/>
-              <a:t>5/8/2013</a:t>
+              <a:t>5/10/2013</a:t>
             </a:fld>
             <a:endParaRPr lang="en-US"/>
           </a:p>
@@ -1889,7 +1889,7 @@
           <a:p>
             <a:fld id="{79CBEA78-6588-4CE9-8068-CCA8CA5A7265}" type="datetimeFigureOut">
               <a:rPr lang="en-US" smtClean="0"/>
-              <a:t>5/8/2013</a:t>
+              <a:t>5/10/2013</a:t>
             </a:fld>
             <a:endParaRPr lang="en-US"/>
           </a:p>
@@ -1984,7 +1984,7 @@
           <a:p>
             <a:fld id="{79CBEA78-6588-4CE9-8068-CCA8CA5A7265}" type="datetimeFigureOut">
               <a:rPr lang="en-US" smtClean="0"/>
-              <a:t>5/8/2013</a:t>
+              <a:t>5/10/2013</a:t>
             </a:fld>
             <a:endParaRPr lang="en-US"/>
           </a:p>
@@ -2261,7 +2261,7 @@
           <a:p>
             <a:fld id="{79CBEA78-6588-4CE9-8068-CCA8CA5A7265}" type="datetimeFigureOut">
               <a:rPr lang="en-US" smtClean="0"/>
-              <a:t>5/8/2013</a:t>
+              <a:t>5/10/2013</a:t>
             </a:fld>
             <a:endParaRPr lang="en-US"/>
           </a:p>
@@ -2514,7 +2514,7 @@
           <a:p>
             <a:fld id="{79CBEA78-6588-4CE9-8068-CCA8CA5A7265}" type="datetimeFigureOut">
               <a:rPr lang="en-US" smtClean="0"/>
-              <a:t>5/8/2013</a:t>
+              <a:t>5/10/2013</a:t>
             </a:fld>
             <a:endParaRPr lang="en-US"/>
           </a:p>
@@ -2732,7 +2732,7 @@
           <a:p>
             <a:fld id="{79CBEA78-6588-4CE9-8068-CCA8CA5A7265}" type="datetimeFigureOut">
               <a:rPr lang="en-US" smtClean="0"/>
-              <a:t>5/8/2013</a:t>
+              <a:t>5/10/2013</a:t>
             </a:fld>
             <a:endParaRPr lang="en-US"/>
           </a:p>
@@ -3985,7 +3985,7 @@
             </a:r>
             <a:r>
               <a:rPr lang="en-US" dirty="0" err="1" smtClean="0"/>
-              <a:t>heterogenity</a:t>
+              <a:t>hetereogenity</a:t>
             </a:r>
             <a:endParaRPr lang="en-US" dirty="0" smtClean="0"/>
           </a:p>

</xml_diff>